<commit_message>
H6 + M4 bespreking
</commit_message>
<xml_diff>
--- a/BesprekingLaboM4.pptx
+++ b/BesprekingLaboM4.pptx
@@ -5900,7 +5900,7 @@
           <p:nvPr>
             <p:extLst>
               <p:ext uri="{D42A27DB-BD31-4B8C-83A1-F6EECF244321}">
-                <p14:modId xmlns:p14="http://schemas.microsoft.com/office/powerpoint/2010/main" val="786081530"/>
+                <p14:modId xmlns:p14="http://schemas.microsoft.com/office/powerpoint/2010/main" val="467328280"/>
               </p:ext>
             </p:extLst>
           </p:nvPr>
@@ -6090,7 +6090,7 @@
                       <a:pPr algn="ctr"/>
                       <a:r>
                         <a:rPr lang="en-US" dirty="0" smtClean="0"/>
-                        <a:t>F = 0,311</a:t>
+                        <a:t>F = 0,31</a:t>
                       </a:r>
                       <a:r>
                         <a:rPr lang="en-US" baseline="0" dirty="0" smtClean="0"/>
@@ -6131,7 +6131,7 @@
                       <a:pPr algn="ctr"/>
                       <a:r>
                         <a:rPr lang="en-US" dirty="0" smtClean="0"/>
-                        <a:t>F = 0,619 L</a:t>
+                        <a:t>F = 0,62 L</a:t>
                       </a:r>
                       <a:endParaRPr lang="en-US" dirty="0"/>
                     </a:p>
@@ -6248,7 +6248,15 @@
             <a:pPr marL="457200" indent="-457200"/>
             <a:r>
               <a:rPr lang="nl-BE" dirty="0" smtClean="0"/>
-              <a:t>Wanneer je de gefitte richtingscoëfficiënt deelt door de kozen variabele, dan bekom je hetzelfde getal, met telkens dezelfde eenheid:</a:t>
+              <a:t>Wanneer je de gefitte richtingscoëfficiënt deelt door </a:t>
+            </a:r>
+            <a:r>
+              <a:rPr lang="nl-BE" smtClean="0"/>
+              <a:t>de gekozen </a:t>
+            </a:r>
+            <a:r>
+              <a:rPr lang="nl-BE" dirty="0" smtClean="0"/>
+              <a:t>variabele, dan bekom je hetzelfde getal, met telkens dezelfde eenheid:</a:t>
             </a:r>
           </a:p>
           <a:p>
@@ -6266,7 +6274,7 @@
           <p:nvPr>
             <p:extLst>
               <p:ext uri="{D42A27DB-BD31-4B8C-83A1-F6EECF244321}">
-                <p14:modId xmlns:p14="http://schemas.microsoft.com/office/powerpoint/2010/main" val="400264237"/>
+                <p14:modId xmlns:p14="http://schemas.microsoft.com/office/powerpoint/2010/main" val="1302302126"/>
               </p:ext>
             </p:extLst>
           </p:nvPr>
@@ -6396,7 +6404,7 @@
                       <a:pPr algn="ctr"/>
                       <a:r>
                         <a:rPr lang="en-US" dirty="0" smtClean="0"/>
-                        <a:t>F = 0,00309 I</a:t>
+                        <a:t>F = 0,0031 I</a:t>
                       </a:r>
                       <a:endParaRPr lang="en-US" dirty="0"/>
                     </a:p>
@@ -6411,7 +6419,7 @@
                       <a:pPr algn="ctr"/>
                       <a:r>
                         <a:rPr lang="en-US" dirty="0" smtClean="0"/>
-                        <a:t>0,155</a:t>
+                        <a:t>0,15</a:t>
                       </a:r>
                       <a:endParaRPr lang="en-US" dirty="0"/>
                     </a:p>
@@ -6452,7 +6460,7 @@
                       <a:pPr algn="ctr"/>
                       <a:r>
                         <a:rPr lang="en-US" dirty="0" smtClean="0"/>
-                        <a:t>F = 0,00465 I</a:t>
+                        <a:t>F = 0,0046 I</a:t>
                       </a:r>
                       <a:endParaRPr lang="en-US" dirty="0"/>
                     </a:p>
@@ -6467,7 +6475,7 @@
                       <a:pPr algn="ctr"/>
                       <a:r>
                         <a:rPr lang="en-US" dirty="0" smtClean="0"/>
-                        <a:t>0,155</a:t>
+                        <a:t>0,16</a:t>
                       </a:r>
                       <a:endParaRPr lang="en-US" dirty="0"/>
                     </a:p>
@@ -6508,7 +6516,7 @@
                       <a:pPr algn="ctr"/>
                       <a:r>
                         <a:rPr lang="en-US" dirty="0" smtClean="0"/>
-                        <a:t>F = 0,311</a:t>
+                        <a:t>F = 0,31</a:t>
                       </a:r>
                       <a:r>
                         <a:rPr lang="en-US" baseline="0" dirty="0" smtClean="0"/>
@@ -6527,7 +6535,7 @@
                       <a:pPr algn="ctr"/>
                       <a:r>
                         <a:rPr lang="en-US" dirty="0" smtClean="0"/>
-                        <a:t>0,156</a:t>
+                        <a:t>0,16</a:t>
                       </a:r>
                       <a:endParaRPr lang="en-US" dirty="0"/>
                     </a:p>
@@ -6564,7 +6572,7 @@
                       <a:pPr algn="ctr"/>
                       <a:r>
                         <a:rPr lang="en-US" dirty="0" smtClean="0"/>
-                        <a:t>F = 0,619 L</a:t>
+                        <a:t>F = 0,62 L</a:t>
                       </a:r>
                       <a:endParaRPr lang="en-US" dirty="0"/>
                     </a:p>
@@ -6579,7 +6587,7 @@
                       <a:pPr algn="ctr"/>
                       <a:r>
                         <a:rPr lang="en-US" dirty="0" smtClean="0"/>
-                        <a:t>0,155</a:t>
+                        <a:t>0,15</a:t>
                       </a:r>
                       <a:endParaRPr lang="en-US" dirty="0"/>
                     </a:p>
@@ -6687,6 +6695,108 @@
             <a:r>
               <a:rPr lang="en-US" dirty="0" err="1" smtClean="0"/>
               <a:t>magneet</a:t>
+            </a:r>
+            <a:endParaRPr lang="en-US" dirty="0"/>
+          </a:p>
+        </p:txBody>
+      </p:sp>
+      <p:sp>
+        <p:nvSpPr>
+          <p:cNvPr id="36" name="Tekstvak 35"/>
+          <p:cNvSpPr txBox="1"/>
+          <p:nvPr/>
+        </p:nvSpPr>
+        <p:spPr>
+          <a:xfrm>
+            <a:off x="5805054" y="5671441"/>
+            <a:ext cx="3854335" cy="646331"/>
+          </a:xfrm>
+          <a:prstGeom prst="rect">
+            <a:avLst/>
+          </a:prstGeom>
+          <a:noFill/>
+        </p:spPr>
+        <p:txBody>
+          <a:bodyPr wrap="square" rtlCol="0">
+            <a:spAutoFit/>
+          </a:bodyPr>
+          <a:lstStyle/>
+          <a:p>
+            <a:r>
+              <a:rPr lang="en-US" dirty="0" smtClean="0"/>
+              <a:t>= </a:t>
+            </a:r>
+            <a:r>
+              <a:rPr lang="en-US" dirty="0" err="1" smtClean="0"/>
+              <a:t>Gemiddelde</a:t>
+            </a:r>
+            <a:r>
+              <a:rPr lang="en-US" dirty="0" smtClean="0"/>
+              <a:t> </a:t>
+            </a:r>
+            <a:r>
+              <a:rPr lang="en-US" dirty="0" err="1" smtClean="0"/>
+              <a:t>magnetische</a:t>
+            </a:r>
+            <a:r>
+              <a:rPr lang="en-US" dirty="0" smtClean="0"/>
+              <a:t> </a:t>
+            </a:r>
+            <a:r>
+              <a:rPr lang="en-US" dirty="0" err="1" smtClean="0"/>
+              <a:t>veldsterkte</a:t>
+            </a:r>
+            <a:r>
+              <a:rPr lang="en-US" dirty="0" smtClean="0"/>
+              <a:t> B van de </a:t>
+            </a:r>
+            <a:r>
+              <a:rPr lang="en-US" dirty="0" err="1" smtClean="0"/>
+              <a:t>magneet</a:t>
+            </a:r>
+            <a:endParaRPr lang="en-US" dirty="0"/>
+          </a:p>
+        </p:txBody>
+      </p:sp>
+      <p:sp>
+        <p:nvSpPr>
+          <p:cNvPr id="33" name="Tekstvak 32"/>
+          <p:cNvSpPr txBox="1"/>
+          <p:nvPr/>
+        </p:nvSpPr>
+        <p:spPr>
+          <a:xfrm>
+            <a:off x="4106488" y="5698540"/>
+            <a:ext cx="1579418" cy="369332"/>
+          </a:xfrm>
+          <a:prstGeom prst="rect">
+            <a:avLst/>
+          </a:prstGeom>
+          <a:noFill/>
+          <a:ln w="28575">
+            <a:solidFill>
+              <a:schemeClr val="tx1"/>
+            </a:solidFill>
+          </a:ln>
+        </p:spPr>
+        <p:txBody>
+          <a:bodyPr wrap="square" rtlCol="0">
+            <a:spAutoFit/>
+          </a:bodyPr>
+          <a:lstStyle/>
+          <a:p>
+            <a:pPr algn="ctr"/>
+            <a:r>
+              <a:rPr lang="en-US" dirty="0" err="1" smtClean="0"/>
+              <a:t>B</a:t>
+            </a:r>
+            <a:r>
+              <a:rPr lang="en-US" baseline="-25000" dirty="0" err="1" smtClean="0"/>
+              <a:t>gem</a:t>
+            </a:r>
+            <a:r>
+              <a:rPr lang="en-US" dirty="0" smtClean="0"/>
+              <a:t> = 0,155 T </a:t>
             </a:r>
             <a:endParaRPr lang="en-US" dirty="0"/>
           </a:p>

</xml_diff>